<commit_message>
Added motor to temperature sensor circuit
</commit_message>
<xml_diff>
--- a/Blender/03 18B20 Temperature sensor/Silk screens.pptx
+++ b/Blender/03 18B20 Temperature sensor/Silk screens.pptx
@@ -539,7 +539,7 @@
           <a:p>
             <a:fld id="{835177E4-60BF-4C8D-A659-95F1E6F38172}" type="datetimeFigureOut">
               <a:rPr lang="en-GB" smtClean="0"/>
-              <a:t>23/12/2024</a:t>
+              <a:t>26/12/2024</a:t>
             </a:fld>
             <a:endParaRPr lang="en-GB"/>
           </a:p>
@@ -739,7 +739,7 @@
           <a:p>
             <a:fld id="{835177E4-60BF-4C8D-A659-95F1E6F38172}" type="datetimeFigureOut">
               <a:rPr lang="en-GB" smtClean="0"/>
-              <a:t>23/12/2024</a:t>
+              <a:t>26/12/2024</a:t>
             </a:fld>
             <a:endParaRPr lang="en-GB"/>
           </a:p>
@@ -949,7 +949,7 @@
           <a:p>
             <a:fld id="{835177E4-60BF-4C8D-A659-95F1E6F38172}" type="datetimeFigureOut">
               <a:rPr lang="en-GB" smtClean="0"/>
-              <a:t>23/12/2024</a:t>
+              <a:t>26/12/2024</a:t>
             </a:fld>
             <a:endParaRPr lang="en-GB"/>
           </a:p>
@@ -1149,7 +1149,7 @@
           <a:p>
             <a:fld id="{835177E4-60BF-4C8D-A659-95F1E6F38172}" type="datetimeFigureOut">
               <a:rPr lang="en-GB" smtClean="0"/>
-              <a:t>23/12/2024</a:t>
+              <a:t>26/12/2024</a:t>
             </a:fld>
             <a:endParaRPr lang="en-GB"/>
           </a:p>
@@ -1425,7 +1425,7 @@
           <a:p>
             <a:fld id="{835177E4-60BF-4C8D-A659-95F1E6F38172}" type="datetimeFigureOut">
               <a:rPr lang="en-GB" smtClean="0"/>
-              <a:t>23/12/2024</a:t>
+              <a:t>26/12/2024</a:t>
             </a:fld>
             <a:endParaRPr lang="en-GB"/>
           </a:p>
@@ -1693,7 +1693,7 @@
           <a:p>
             <a:fld id="{835177E4-60BF-4C8D-A659-95F1E6F38172}" type="datetimeFigureOut">
               <a:rPr lang="en-GB" smtClean="0"/>
-              <a:t>23/12/2024</a:t>
+              <a:t>26/12/2024</a:t>
             </a:fld>
             <a:endParaRPr lang="en-GB"/>
           </a:p>
@@ -2108,7 +2108,7 @@
           <a:p>
             <a:fld id="{835177E4-60BF-4C8D-A659-95F1E6F38172}" type="datetimeFigureOut">
               <a:rPr lang="en-GB" smtClean="0"/>
-              <a:t>23/12/2024</a:t>
+              <a:t>26/12/2024</a:t>
             </a:fld>
             <a:endParaRPr lang="en-GB"/>
           </a:p>
@@ -2250,7 +2250,7 @@
           <a:p>
             <a:fld id="{835177E4-60BF-4C8D-A659-95F1E6F38172}" type="datetimeFigureOut">
               <a:rPr lang="en-GB" smtClean="0"/>
-              <a:t>23/12/2024</a:t>
+              <a:t>26/12/2024</a:t>
             </a:fld>
             <a:endParaRPr lang="en-GB"/>
           </a:p>
@@ -2363,7 +2363,7 @@
           <a:p>
             <a:fld id="{835177E4-60BF-4C8D-A659-95F1E6F38172}" type="datetimeFigureOut">
               <a:rPr lang="en-GB" smtClean="0"/>
-              <a:t>23/12/2024</a:t>
+              <a:t>26/12/2024</a:t>
             </a:fld>
             <a:endParaRPr lang="en-GB"/>
           </a:p>
@@ -2676,7 +2676,7 @@
           <a:p>
             <a:fld id="{835177E4-60BF-4C8D-A659-95F1E6F38172}" type="datetimeFigureOut">
               <a:rPr lang="en-GB" smtClean="0"/>
-              <a:t>23/12/2024</a:t>
+              <a:t>26/12/2024</a:t>
             </a:fld>
             <a:endParaRPr lang="en-GB"/>
           </a:p>
@@ -2965,7 +2965,7 @@
           <a:p>
             <a:fld id="{835177E4-60BF-4C8D-A659-95F1E6F38172}" type="datetimeFigureOut">
               <a:rPr lang="en-GB" smtClean="0"/>
-              <a:t>23/12/2024</a:t>
+              <a:t>26/12/2024</a:t>
             </a:fld>
             <a:endParaRPr lang="en-GB"/>
           </a:p>
@@ -3208,7 +3208,7 @@
           <a:p>
             <a:fld id="{835177E4-60BF-4C8D-A659-95F1E6F38172}" type="datetimeFigureOut">
               <a:rPr lang="en-GB" smtClean="0"/>
-              <a:t>23/12/2024</a:t>
+              <a:t>26/12/2024</a:t>
             </a:fld>
             <a:endParaRPr lang="en-GB"/>
           </a:p>
@@ -3942,20 +3942,8 @@
           <a:lstStyle/>
           <a:p>
             <a:r>
-              <a:rPr lang="en-GB"/>
-              <a:t>0</a:t>
-            </a:r>
-            <a:r>
               <a:rPr lang="en-GB" dirty="0"/>
-              <a:t>3</a:t>
-            </a:r>
-            <a:r>
-              <a:rPr lang="en-GB"/>
-              <a:t> </a:t>
-            </a:r>
-            <a:r>
-              <a:rPr lang="en-GB" dirty="0"/>
-              <a:t>18B20 Temperature sensor</a:t>
+              <a:t>03 18B20 Temperature sensor</a:t>
             </a:r>
           </a:p>
         </p:txBody>
@@ -4918,6 +4906,212 @@
           </a:p>
         </p:txBody>
       </p:sp>
+      <p:pic>
+        <p:nvPicPr>
+          <p:cNvPr id="28" name="Graphic 27">
+            <a:extLst>
+              <a:ext uri="{FF2B5EF4-FFF2-40B4-BE49-F238E27FC236}">
+                <a16:creationId xmlns:a16="http://schemas.microsoft.com/office/drawing/2014/main" id="{7AF4A890-F28E-E78B-86A9-320BA4613A2F}"/>
+              </a:ext>
+            </a:extLst>
+          </p:cNvPr>
+          <p:cNvPicPr>
+            <a:picLocks noChangeAspect="1"/>
+          </p:cNvPicPr>
+          <p:nvPr/>
+        </p:nvPicPr>
+        <p:blipFill>
+          <a:blip r:embed="rId2">
+            <a:extLst>
+              <a:ext uri="{96DAC541-7B7A-43D3-8B79-37D633B846F1}">
+                <asvg:svgBlip xmlns:asvg="http://schemas.microsoft.com/office/drawing/2016/SVG/main" r:embed="rId3"/>
+              </a:ext>
+            </a:extLst>
+          </a:blip>
+          <a:stretch>
+            <a:fillRect/>
+          </a:stretch>
+        </p:blipFill>
+        <p:spPr>
+          <a:xfrm>
+            <a:off x="7307164" y="2183506"/>
+            <a:ext cx="1235273" cy="1605853"/>
+          </a:xfrm>
+          <a:prstGeom prst="rect">
+            <a:avLst/>
+          </a:prstGeom>
+        </p:spPr>
+      </p:pic>
+      <p:sp>
+        <p:nvSpPr>
+          <p:cNvPr id="30" name="TextBox 29">
+            <a:extLst>
+              <a:ext uri="{FF2B5EF4-FFF2-40B4-BE49-F238E27FC236}">
+                <a16:creationId xmlns:a16="http://schemas.microsoft.com/office/drawing/2014/main" id="{69D39C20-EFF4-D6C6-2804-3F8B1A2E2CC8}"/>
+              </a:ext>
+            </a:extLst>
+          </p:cNvPr>
+          <p:cNvSpPr txBox="1"/>
+          <p:nvPr/>
+        </p:nvSpPr>
+        <p:spPr>
+          <a:xfrm>
+            <a:off x="7512628" y="3786989"/>
+            <a:ext cx="284429" cy="369332"/>
+          </a:xfrm>
+          <a:prstGeom prst="rect">
+            <a:avLst/>
+          </a:prstGeom>
+          <a:noFill/>
+        </p:spPr>
+        <p:txBody>
+          <a:bodyPr wrap="square">
+            <a:spAutoFit/>
+          </a:bodyPr>
+          <a:lstStyle/>
+          <a:p>
+            <a:r>
+              <a:rPr lang="en-GB" dirty="0"/>
+              <a:t>1</a:t>
+            </a:r>
+          </a:p>
+        </p:txBody>
+      </p:sp>
+      <p:sp>
+        <p:nvSpPr>
+          <p:cNvPr id="31" name="TextBox 30">
+            <a:extLst>
+              <a:ext uri="{FF2B5EF4-FFF2-40B4-BE49-F238E27FC236}">
+                <a16:creationId xmlns:a16="http://schemas.microsoft.com/office/drawing/2014/main" id="{E48588D7-DB43-FD82-B206-2AB44E4EA446}"/>
+              </a:ext>
+            </a:extLst>
+          </p:cNvPr>
+          <p:cNvSpPr txBox="1"/>
+          <p:nvPr/>
+        </p:nvSpPr>
+        <p:spPr>
+          <a:xfrm>
+            <a:off x="7782585" y="3786989"/>
+            <a:ext cx="284429" cy="369332"/>
+          </a:xfrm>
+          <a:prstGeom prst="rect">
+            <a:avLst/>
+          </a:prstGeom>
+          <a:noFill/>
+        </p:spPr>
+        <p:txBody>
+          <a:bodyPr wrap="square">
+            <a:spAutoFit/>
+          </a:bodyPr>
+          <a:lstStyle/>
+          <a:p>
+            <a:r>
+              <a:rPr lang="en-GB" dirty="0"/>
+              <a:t>2</a:t>
+            </a:r>
+          </a:p>
+        </p:txBody>
+      </p:sp>
+      <p:sp>
+        <p:nvSpPr>
+          <p:cNvPr id="32" name="TextBox 31">
+            <a:extLst>
+              <a:ext uri="{FF2B5EF4-FFF2-40B4-BE49-F238E27FC236}">
+                <a16:creationId xmlns:a16="http://schemas.microsoft.com/office/drawing/2014/main" id="{DE2DA31A-41BF-CDBE-8CE0-A25A71C3E98A}"/>
+              </a:ext>
+            </a:extLst>
+          </p:cNvPr>
+          <p:cNvSpPr txBox="1"/>
+          <p:nvPr/>
+        </p:nvSpPr>
+        <p:spPr>
+          <a:xfrm>
+            <a:off x="8002521" y="3786989"/>
+            <a:ext cx="284429" cy="369332"/>
+          </a:xfrm>
+          <a:prstGeom prst="rect">
+            <a:avLst/>
+          </a:prstGeom>
+          <a:noFill/>
+        </p:spPr>
+        <p:txBody>
+          <a:bodyPr wrap="square">
+            <a:spAutoFit/>
+          </a:bodyPr>
+          <a:lstStyle/>
+          <a:p>
+            <a:r>
+              <a:rPr lang="en-GB" dirty="0"/>
+              <a:t>3</a:t>
+            </a:r>
+          </a:p>
+        </p:txBody>
+      </p:sp>
+      <p:sp>
+        <p:nvSpPr>
+          <p:cNvPr id="36" name="TextBox 35">
+            <a:extLst>
+              <a:ext uri="{FF2B5EF4-FFF2-40B4-BE49-F238E27FC236}">
+                <a16:creationId xmlns:a16="http://schemas.microsoft.com/office/drawing/2014/main" id="{8C229E4D-3AB8-62DD-2CBB-44D988FC989D}"/>
+              </a:ext>
+            </a:extLst>
+          </p:cNvPr>
+          <p:cNvSpPr txBox="1"/>
+          <p:nvPr/>
+        </p:nvSpPr>
+        <p:spPr>
+          <a:xfrm>
+            <a:off x="3048000" y="2967335"/>
+            <a:ext cx="6096000" cy="923330"/>
+          </a:xfrm>
+          <a:prstGeom prst="rect">
+            <a:avLst/>
+          </a:prstGeom>
+          <a:noFill/>
+        </p:spPr>
+        <p:txBody>
+          <a:bodyPr wrap="square">
+            <a:spAutoFit/>
+          </a:bodyPr>
+          <a:lstStyle/>
+          <a:p>
+            <a:r>
+              <a:rPr lang="en-GB" dirty="0"/>
+              <a:t> 	https://shop.pimoroni.com/products/ds18b20-programmable-resolution-1-wire-digital-thermometer?variant=32127344640083</a:t>
+            </a:r>
+          </a:p>
+        </p:txBody>
+      </p:sp>
+      <p:pic>
+        <p:nvPicPr>
+          <p:cNvPr id="38" name="Picture 37">
+            <a:extLst>
+              <a:ext uri="{FF2B5EF4-FFF2-40B4-BE49-F238E27FC236}">
+                <a16:creationId xmlns:a16="http://schemas.microsoft.com/office/drawing/2014/main" id="{65255CF0-B5A2-F062-7816-FD7C007ED34F}"/>
+              </a:ext>
+            </a:extLst>
+          </p:cNvPr>
+          <p:cNvPicPr>
+            <a:picLocks noChangeAspect="1"/>
+          </p:cNvPicPr>
+          <p:nvPr/>
+        </p:nvPicPr>
+        <p:blipFill>
+          <a:blip r:embed="rId4"/>
+          <a:stretch>
+            <a:fillRect/>
+          </a:stretch>
+        </p:blipFill>
+        <p:spPr>
+          <a:xfrm>
+            <a:off x="5100498" y="2495419"/>
+            <a:ext cx="1991003" cy="1867161"/>
+          </a:xfrm>
+          <a:prstGeom prst="rect">
+            <a:avLst/>
+          </a:prstGeom>
+        </p:spPr>
+      </p:pic>
     </p:spTree>
     <p:extLst>
       <p:ext uri="{BB962C8B-B14F-4D97-AF65-F5344CB8AC3E}">

</xml_diff>